<commit_message>
added image of justsaysinmice tweet
</commit_message>
<xml_diff>
--- a/lectures/1-probability-slides-rev.pptx
+++ b/lectures/1-probability-slides-rev.pptx
@@ -219,7 +219,7 @@
           <a:p>
             <a:fld id="{37E2103D-89B8-1F4F-8EFD-F26027AC662B}" type="datetimeFigureOut">
               <a:rPr lang="en-US" smtClean="0"/>
-              <a:t>1/6/20</a:t>
+              <a:t>1/7/20</a:t>
             </a:fld>
             <a:endParaRPr lang="en-US"/>
           </a:p>
@@ -752,7 +752,7 @@
           <a:p>
             <a:fld id="{241EB5C9-1307-BA42-ABA2-0BC069CD8E7F}" type="datetimeFigureOut">
               <a:rPr lang="en-US" smtClean="0"/>
-              <a:t>1/6/20</a:t>
+              <a:t>1/7/20</a:t>
             </a:fld>
             <a:endParaRPr lang="en-US"/>
           </a:p>
@@ -920,7 +920,7 @@
           <a:p>
             <a:fld id="{241EB5C9-1307-BA42-ABA2-0BC069CD8E7F}" type="datetimeFigureOut">
               <a:rPr lang="en-US" smtClean="0"/>
-              <a:t>1/6/20</a:t>
+              <a:t>1/7/20</a:t>
             </a:fld>
             <a:endParaRPr lang="en-US"/>
           </a:p>
@@ -1098,7 +1098,7 @@
           <a:p>
             <a:fld id="{241EB5C9-1307-BA42-ABA2-0BC069CD8E7F}" type="datetimeFigureOut">
               <a:rPr lang="en-US" smtClean="0"/>
-              <a:t>1/6/20</a:t>
+              <a:t>1/7/20</a:t>
             </a:fld>
             <a:endParaRPr lang="en-US"/>
           </a:p>
@@ -1283,7 +1283,7 @@
           <a:p>
             <a:fld id="{241EB5C9-1307-BA42-ABA2-0BC069CD8E7F}" type="datetimeFigureOut">
               <a:rPr lang="en-US" smtClean="0"/>
-              <a:t>1/6/20</a:t>
+              <a:t>1/7/20</a:t>
             </a:fld>
             <a:endParaRPr lang="en-US"/>
           </a:p>
@@ -1528,7 +1528,7 @@
           <a:p>
             <a:fld id="{241EB5C9-1307-BA42-ABA2-0BC069CD8E7F}" type="datetimeFigureOut">
               <a:rPr lang="en-US" smtClean="0"/>
-              <a:t>1/6/20</a:t>
+              <a:t>1/7/20</a:t>
             </a:fld>
             <a:endParaRPr lang="en-US"/>
           </a:p>
@@ -1813,7 +1813,7 @@
           <a:p>
             <a:fld id="{241EB5C9-1307-BA42-ABA2-0BC069CD8E7F}" type="datetimeFigureOut">
               <a:rPr lang="en-US" smtClean="0"/>
-              <a:t>1/6/20</a:t>
+              <a:t>1/7/20</a:t>
             </a:fld>
             <a:endParaRPr lang="en-US"/>
           </a:p>
@@ -2232,7 +2232,7 @@
           <a:p>
             <a:fld id="{241EB5C9-1307-BA42-ABA2-0BC069CD8E7F}" type="datetimeFigureOut">
               <a:rPr lang="en-US" smtClean="0"/>
-              <a:t>1/6/20</a:t>
+              <a:t>1/7/20</a:t>
             </a:fld>
             <a:endParaRPr lang="en-US"/>
           </a:p>
@@ -2349,7 +2349,7 @@
           <a:p>
             <a:fld id="{241EB5C9-1307-BA42-ABA2-0BC069CD8E7F}" type="datetimeFigureOut">
               <a:rPr lang="en-US" smtClean="0"/>
-              <a:t>1/6/20</a:t>
+              <a:t>1/7/20</a:t>
             </a:fld>
             <a:endParaRPr lang="en-US"/>
           </a:p>
@@ -2444,7 +2444,7 @@
           <a:p>
             <a:fld id="{241EB5C9-1307-BA42-ABA2-0BC069CD8E7F}" type="datetimeFigureOut">
               <a:rPr lang="en-US" smtClean="0"/>
-              <a:t>1/6/20</a:t>
+              <a:t>1/7/20</a:t>
             </a:fld>
             <a:endParaRPr lang="en-US"/>
           </a:p>
@@ -2719,7 +2719,7 @@
           <a:p>
             <a:fld id="{241EB5C9-1307-BA42-ABA2-0BC069CD8E7F}" type="datetimeFigureOut">
               <a:rPr lang="en-US" smtClean="0"/>
-              <a:t>1/6/20</a:t>
+              <a:t>1/7/20</a:t>
             </a:fld>
             <a:endParaRPr lang="en-US"/>
           </a:p>
@@ -2971,7 +2971,7 @@
           <a:p>
             <a:fld id="{241EB5C9-1307-BA42-ABA2-0BC069CD8E7F}" type="datetimeFigureOut">
               <a:rPr lang="en-US" smtClean="0"/>
-              <a:t>1/6/20</a:t>
+              <a:t>1/7/20</a:t>
             </a:fld>
             <a:endParaRPr lang="en-US"/>
           </a:p>
@@ -3182,7 +3182,7 @@
           <a:p>
             <a:fld id="{241EB5C9-1307-BA42-ABA2-0BC069CD8E7F}" type="datetimeFigureOut">
               <a:rPr lang="en-US" smtClean="0"/>
-              <a:t>1/6/20</a:t>
+              <a:t>1/7/20</a:t>
             </a:fld>
             <a:endParaRPr lang="en-US"/>
           </a:p>
@@ -3670,6 +3670,14 @@
 <file path=ppt/slides/slide10.xml><?xml version="1.0" encoding="utf-8"?>
 <p:sld xmlns:a="http://schemas.openxmlformats.org/drawingml/2006/main" xmlns:r="http://schemas.openxmlformats.org/officeDocument/2006/relationships" xmlns:p="http://schemas.openxmlformats.org/presentationml/2006/main">
   <p:cSld>
+    <p:bg>
+      <p:bgPr>
+        <a:solidFill>
+          <a:schemeClr val="bg1"/>
+        </a:solidFill>
+        <a:effectLst/>
+      </p:bgPr>
+    </p:bg>
     <p:spTree>
       <p:nvGrpSpPr>
         <p:cNvPr id="1" name=""/>
@@ -3694,15 +3702,23 @@
             <p:ph type="title"/>
           </p:nvPr>
         </p:nvSpPr>
-        <p:spPr/>
-        <p:txBody>
-          <a:bodyPr/>
+        <p:spPr>
+          <a:xfrm>
+            <a:off x="648929" y="629266"/>
+            <a:ext cx="6279408" cy="1676603"/>
+          </a:xfrm>
+        </p:spPr>
+        <p:txBody>
+          <a:bodyPr>
+            <a:normAutofit/>
+          </a:bodyPr>
           <a:lstStyle/>
           <a:p>
             <a:pPr marL="0" lvl="0" indent="0">
               <a:buNone/>
             </a:pPr>
             <a:r>
+              <a:rPr dirty="0"/>
               <a:t>Sampling and Scope of Inference</a:t>
             </a:r>
           </a:p>
@@ -3718,7 +3734,12 @@
             <p:ph idx="1"/>
           </p:nvPr>
         </p:nvSpPr>
-        <p:spPr/>
+        <p:spPr>
+          <a:xfrm>
+            <a:off x="648930" y="2438400"/>
+            <a:ext cx="6279408" cy="3785419"/>
+          </a:xfrm>
+        </p:spPr>
         <p:txBody>
           <a:bodyPr>
             <a:normAutofit/>
@@ -3727,82 +3748,111 @@
           <a:p>
             <a:pPr>
               <a:lnSpc>
-                <a:spcPct val="150000"/>
+                <a:spcPct val="90000"/>
               </a:lnSpc>
             </a:pPr>
             <a:r>
-              <a:rPr dirty="0"/>
+              <a:rPr lang="en-US" sz="2200" dirty="0"/>
               <a:t>Definition of probability assumes trials are representative of a “population”</a:t>
             </a:r>
           </a:p>
           <a:p>
             <a:pPr>
               <a:lnSpc>
-                <a:spcPct val="150000"/>
+                <a:spcPct val="90000"/>
               </a:lnSpc>
             </a:pPr>
             <a:r>
-              <a:rPr dirty="0"/>
+              <a:rPr lang="en-US" sz="2200" dirty="0"/>
               <a:t>“population” (statistics definition) = larger group for which you estimating the probability</a:t>
             </a:r>
           </a:p>
           <a:p>
             <a:pPr>
               <a:lnSpc>
-                <a:spcPct val="150000"/>
+                <a:spcPct val="90000"/>
               </a:lnSpc>
             </a:pPr>
             <a:r>
-              <a:rPr dirty="0"/>
+              <a:rPr lang="en-US" sz="2200" dirty="0"/>
               <a:t>Trials should be </a:t>
             </a:r>
             <a:r>
-              <a:rPr b="1" dirty="0"/>
+              <a:rPr lang="en-US" sz="2200" b="1" dirty="0"/>
               <a:t>representative</a:t>
             </a:r>
             <a:r>
-              <a:rPr dirty="0"/>
+              <a:rPr lang="en-US" sz="2200" dirty="0"/>
               <a:t> and </a:t>
             </a:r>
             <a:r>
-              <a:rPr b="1" dirty="0"/>
+              <a:rPr lang="en-US" sz="2200" b="1" dirty="0"/>
               <a:t>independent</a:t>
             </a:r>
             <a:r>
-              <a:rPr dirty="0"/>
+              <a:rPr lang="en-US" sz="2200" dirty="0"/>
               <a:t>.</a:t>
             </a:r>
-            <a:endParaRPr lang="en-US" dirty="0"/>
           </a:p>
           <a:p>
             <a:pPr>
               <a:lnSpc>
-                <a:spcPct val="150000"/>
+                <a:spcPct val="90000"/>
               </a:lnSpc>
             </a:pPr>
             <a:r>
-              <a:rPr dirty="0"/>
+              <a:rPr lang="en-US" sz="2200" dirty="0"/>
               <a:t>Scope of inference = “population” over which your data are </a:t>
             </a:r>
             <a:r>
-              <a:rPr b="1" dirty="0"/>
+              <a:rPr lang="en-US" sz="2200" b="1" dirty="0"/>
               <a:t>representative</a:t>
             </a:r>
             <a:r>
-              <a:rPr dirty="0"/>
+              <a:rPr lang="en-US" sz="2200" dirty="0"/>
               <a:t> and </a:t>
             </a:r>
             <a:r>
-              <a:rPr b="1" dirty="0"/>
+              <a:rPr lang="en-US" sz="2200" b="1" dirty="0"/>
               <a:t>independent</a:t>
             </a:r>
             <a:r>
-              <a:rPr dirty="0"/>
+              <a:rPr lang="en-US" sz="2200" dirty="0"/>
               <a:t> observations</a:t>
             </a:r>
           </a:p>
         </p:txBody>
       </p:sp>
+      <p:pic>
+        <p:nvPicPr>
+          <p:cNvPr id="5" name="Picture 4" descr="A screenshot of a cell phone&#10;&#10;Description automatically generated">
+            <a:extLst>
+              <a:ext uri="{FF2B5EF4-FFF2-40B4-BE49-F238E27FC236}">
+                <a16:creationId xmlns:a16="http://schemas.microsoft.com/office/drawing/2014/main" id="{5C318D25-149D-874D-B898-54331159949E}"/>
+              </a:ext>
+            </a:extLst>
+          </p:cNvPr>
+          <p:cNvPicPr>
+            <a:picLocks noChangeAspect="1"/>
+          </p:cNvPicPr>
+          <p:nvPr/>
+        </p:nvPicPr>
+        <p:blipFill rotWithShape="1">
+          <a:blip r:embed="rId2"/>
+          <a:srcRect t="1599" r="2" b="5213"/>
+          <a:stretch/>
+        </p:blipFill>
+        <p:spPr>
+          <a:xfrm>
+            <a:off x="7051431" y="796743"/>
+            <a:ext cx="4847775" cy="5264514"/>
+          </a:xfrm>
+          <a:prstGeom prst="rect">
+            <a:avLst/>
+          </a:prstGeom>
+          <a:effectLst/>
+        </p:spPr>
+      </p:pic>
     </p:spTree>
   </p:cSld>
   <p:clrMapOvr>
@@ -3994,6 +4044,51 @@
                                               <p:pRg st="3" end="3"/>
                                             </p:txEl>
                                           </p:spTgt>
+                                        </p:tgtEl>
+                                        <p:attrNameLst>
+                                          <p:attrName>style.visibility</p:attrName>
+                                        </p:attrNameLst>
+                                      </p:cBhvr>
+                                      <p:to>
+                                        <p:strVal val="visible"/>
+                                      </p:to>
+                                    </p:set>
+                                  </p:childTnLst>
+                                </p:cTn>
+                              </p:par>
+                            </p:childTnLst>
+                          </p:cTn>
+                        </p:par>
+                      </p:childTnLst>
+                    </p:cTn>
+                  </p:par>
+                  <p:par>
+                    <p:cTn id="19" fill="hold">
+                      <p:stCondLst>
+                        <p:cond delay="indefinite"/>
+                      </p:stCondLst>
+                      <p:childTnLst>
+                        <p:par>
+                          <p:cTn id="20" fill="hold">
+                            <p:stCondLst>
+                              <p:cond delay="0"/>
+                            </p:stCondLst>
+                            <p:childTnLst>
+                              <p:par>
+                                <p:cTn id="21" presetID="1" presetClass="entr" presetSubtype="0" fill="hold" nodeType="clickEffect">
+                                  <p:stCondLst>
+                                    <p:cond delay="0"/>
+                                  </p:stCondLst>
+                                  <p:childTnLst>
+                                    <p:set>
+                                      <p:cBhvr>
+                                        <p:cTn id="22" dur="1" fill="hold">
+                                          <p:stCondLst>
+                                            <p:cond delay="0"/>
+                                          </p:stCondLst>
+                                        </p:cTn>
+                                        <p:tgtEl>
+                                          <p:spTgt spid="5"/>
                                         </p:tgtEl>
                                         <p:attrNameLst>
                                           <p:attrName>style.visibility</p:attrName>
@@ -7337,8 +7432,8 @@
           </a:p>
         </p:txBody>
       </p:sp>
-      <mc:AlternateContent xmlns:mc="http://schemas.openxmlformats.org/markup-compatibility/2006">
-        <mc:Choice xmlns:a14="http://schemas.microsoft.com/office/drawing/2010/main" Requires="a14">
+      <mc:AlternateContent xmlns:mc="http://schemas.openxmlformats.org/markup-compatibility/2006" xmlns:a14="http://schemas.microsoft.com/office/drawing/2010/main">
+        <mc:Choice Requires="a14">
           <p:sp>
             <p:nvSpPr>
               <p:cNvPr id="3" name="Content Placeholder 2"/>
@@ -7977,7 +8072,7 @@
             </p:txBody>
           </p:sp>
         </mc:Choice>
-        <mc:Fallback>
+        <mc:Fallback xmlns="">
           <p:sp>
             <p:nvSpPr>
               <p:cNvPr id="3" name="Content Placeholder 2"/>
@@ -8482,8 +8577,8 @@
           </a:graphicData>
         </a:graphic>
       </p:graphicFrame>
-      <mc:AlternateContent xmlns:mc="http://schemas.openxmlformats.org/markup-compatibility/2006">
-        <mc:Choice xmlns:a14="http://schemas.microsoft.com/office/drawing/2010/main" Requires="a14">
+      <mc:AlternateContent xmlns:mc="http://schemas.openxmlformats.org/markup-compatibility/2006" xmlns:a14="http://schemas.microsoft.com/office/drawing/2010/main">
+        <mc:Choice Requires="a14">
           <p:sp>
             <p:nvSpPr>
               <p:cNvPr id="5" name="Rectangle 4">
@@ -8695,7 +8790,7 @@
             </p:txBody>
           </p:sp>
         </mc:Choice>
-        <mc:Fallback>
+        <mc:Fallback xmlns="">
           <p:sp>
             <p:nvSpPr>
               <p:cNvPr id="5" name="Rectangle 4">
@@ -8740,8 +8835,8 @@
           </p:sp>
         </mc:Fallback>
       </mc:AlternateContent>
-      <mc:AlternateContent xmlns:mc="http://schemas.openxmlformats.org/markup-compatibility/2006">
-        <mc:Choice xmlns:a14="http://schemas.microsoft.com/office/drawing/2010/main" Requires="a14">
+      <mc:AlternateContent xmlns:mc="http://schemas.openxmlformats.org/markup-compatibility/2006" xmlns:a14="http://schemas.microsoft.com/office/drawing/2010/main">
+        <mc:Choice Requires="a14">
           <p:sp>
             <p:nvSpPr>
               <p:cNvPr id="7" name="Rectangle 6">
@@ -8878,7 +8973,7 @@
             </p:txBody>
           </p:sp>
         </mc:Choice>
-        <mc:Fallback>
+        <mc:Fallback xmlns="">
           <p:sp>
             <p:nvSpPr>
               <p:cNvPr id="7" name="Rectangle 6">

</xml_diff>